<commit_message>
Tommy: update web interface
</commit_message>
<xml_diff>
--- a/VAST19/mc1/TTU-Vuong-MC1/images/Figures.pptx
+++ b/VAST19/mc1/TTU-Vuong-MC1/images/Figures.pptx
@@ -5,10 +5,12 @@
     <p:sldMasterId id="2147483648" r:id="rId1"/>
   </p:sldMasterIdLst>
   <p:notesMasterIdLst>
-    <p:notesMasterId r:id="rId3"/>
+    <p:notesMasterId r:id="rId5"/>
   </p:notesMasterIdLst>
   <p:sldIdLst>
     <p:sldId id="257" r:id="rId2"/>
+    <p:sldId id="258" r:id="rId3"/>
+    <p:sldId id="259" r:id="rId4"/>
   </p:sldIdLst>
   <p:sldSz cx="12192000" cy="6858000"/>
   <p:notesSz cx="6858000" cy="9144000"/>
@@ -4335,6 +4337,740 @@
     <p:extLst>
       <p:ext uri="{BB962C8B-B14F-4D97-AF65-F5344CB8AC3E}">
         <p14:creationId xmlns:p14="http://schemas.microsoft.com/office/powerpoint/2010/main" val="698865496"/>
+      </p:ext>
+    </p:extLst>
+  </p:cSld>
+  <p:clrMapOvr>
+    <a:masterClrMapping/>
+  </p:clrMapOvr>
+  <p:timing>
+    <p:tnLst>
+      <p:par>
+        <p:cTn id="1" dur="indefinite" restart="never" nodeType="tmRoot"/>
+      </p:par>
+    </p:tnLst>
+  </p:timing>
+</p:sld>
+</file>
+
+<file path=ppt/slides/slide2.xml><?xml version="1.0" encoding="utf-8"?>
+<p:sld xmlns:a="http://schemas.openxmlformats.org/drawingml/2006/main" xmlns:r="http://schemas.openxmlformats.org/officeDocument/2006/relationships" xmlns:p="http://schemas.openxmlformats.org/presentationml/2006/main">
+  <p:cSld>
+    <p:spTree>
+      <p:nvGrpSpPr>
+        <p:cNvPr id="1" name=""/>
+        <p:cNvGrpSpPr/>
+        <p:nvPr/>
+      </p:nvGrpSpPr>
+      <p:grpSpPr>
+        <a:xfrm>
+          <a:off x="0" y="0"/>
+          <a:ext cx="0" cy="0"/>
+          <a:chOff x="0" y="0"/>
+          <a:chExt cx="0" cy="0"/>
+        </a:xfrm>
+      </p:grpSpPr>
+      <p:pic>
+        <p:nvPicPr>
+          <p:cNvPr id="4" name="Picture 3"/>
+          <p:cNvPicPr>
+            <a:picLocks noChangeAspect="1"/>
+          </p:cNvPicPr>
+          <p:nvPr/>
+        </p:nvPicPr>
+        <p:blipFill>
+          <a:blip r:embed="rId2">
+            <a:extLst>
+              <a:ext uri="{28A0092B-C50C-407E-A947-70E740481C1C}">
+                <a14:useLocalDpi xmlns:a14="http://schemas.microsoft.com/office/drawing/2010/main" val="0"/>
+              </a:ext>
+            </a:extLst>
+          </a:blip>
+          <a:stretch>
+            <a:fillRect/>
+          </a:stretch>
+        </p:blipFill>
+        <p:spPr>
+          <a:xfrm>
+            <a:off x="185222" y="123041"/>
+            <a:ext cx="3686134" cy="1225065"/>
+          </a:xfrm>
+          <a:prstGeom prst="rect">
+            <a:avLst/>
+          </a:prstGeom>
+        </p:spPr>
+      </p:pic>
+      <p:pic>
+        <p:nvPicPr>
+          <p:cNvPr id="6" name="Picture 5"/>
+          <p:cNvPicPr>
+            <a:picLocks noChangeAspect="1"/>
+          </p:cNvPicPr>
+          <p:nvPr/>
+        </p:nvPicPr>
+        <p:blipFill>
+          <a:blip r:embed="rId3">
+            <a:extLst>
+              <a:ext uri="{28A0092B-C50C-407E-A947-70E740481C1C}">
+                <a14:useLocalDpi xmlns:a14="http://schemas.microsoft.com/office/drawing/2010/main" val="0"/>
+              </a:ext>
+            </a:extLst>
+          </a:blip>
+          <a:stretch>
+            <a:fillRect/>
+          </a:stretch>
+        </p:blipFill>
+        <p:spPr>
+          <a:xfrm>
+            <a:off x="4500748" y="0"/>
+            <a:ext cx="3223655" cy="3265794"/>
+          </a:xfrm>
+          <a:prstGeom prst="rect">
+            <a:avLst/>
+          </a:prstGeom>
+        </p:spPr>
+      </p:pic>
+      <p:pic>
+        <p:nvPicPr>
+          <p:cNvPr id="7" name="Picture 6"/>
+          <p:cNvPicPr>
+            <a:picLocks noChangeAspect="1"/>
+          </p:cNvPicPr>
+          <p:nvPr/>
+        </p:nvPicPr>
+        <p:blipFill>
+          <a:blip r:embed="rId4">
+            <a:extLst>
+              <a:ext uri="{28A0092B-C50C-407E-A947-70E740481C1C}">
+                <a14:useLocalDpi xmlns:a14="http://schemas.microsoft.com/office/drawing/2010/main" val="0"/>
+              </a:ext>
+            </a:extLst>
+          </a:blip>
+          <a:stretch>
+            <a:fillRect/>
+          </a:stretch>
+        </p:blipFill>
+        <p:spPr>
+          <a:xfrm>
+            <a:off x="7945583" y="481115"/>
+            <a:ext cx="4191000" cy="2451100"/>
+          </a:xfrm>
+          <a:prstGeom prst="rect">
+            <a:avLst/>
+          </a:prstGeom>
+        </p:spPr>
+      </p:pic>
+      <p:pic>
+        <p:nvPicPr>
+          <p:cNvPr id="8" name="Picture 7"/>
+          <p:cNvPicPr>
+            <a:picLocks noChangeAspect="1"/>
+          </p:cNvPicPr>
+          <p:nvPr/>
+        </p:nvPicPr>
+        <p:blipFill>
+          <a:blip r:embed="rId5">
+            <a:extLst>
+              <a:ext uri="{28A0092B-C50C-407E-A947-70E740481C1C}">
+                <a14:useLocalDpi xmlns:a14="http://schemas.microsoft.com/office/drawing/2010/main" val="0"/>
+              </a:ext>
+            </a:extLst>
+          </a:blip>
+          <a:stretch>
+            <a:fillRect/>
+          </a:stretch>
+        </p:blipFill>
+        <p:spPr>
+          <a:xfrm>
+            <a:off x="185222" y="1514599"/>
+            <a:ext cx="3686134" cy="1631033"/>
+          </a:xfrm>
+          <a:prstGeom prst="rect">
+            <a:avLst/>
+          </a:prstGeom>
+        </p:spPr>
+      </p:pic>
+      <p:sp>
+        <p:nvSpPr>
+          <p:cNvPr id="9" name="TextBox 8"/>
+          <p:cNvSpPr txBox="1"/>
+          <p:nvPr/>
+        </p:nvSpPr>
+        <p:spPr>
+          <a:xfrm>
+            <a:off x="1579418" y="1026393"/>
+            <a:ext cx="301686" cy="369332"/>
+          </a:xfrm>
+          <a:prstGeom prst="rect">
+            <a:avLst/>
+          </a:prstGeom>
+          <a:noFill/>
+        </p:spPr>
+        <p:txBody>
+          <a:bodyPr wrap="none" rtlCol="0">
+            <a:spAutoFit/>
+          </a:bodyPr>
+          <a:lstStyle/>
+          <a:p>
+            <a:r>
+              <a:rPr lang="en-US" smtClean="0"/>
+              <a:t>0</a:t>
+            </a:r>
+            <a:endParaRPr lang="en-US"/>
+          </a:p>
+        </p:txBody>
+      </p:sp>
+      <p:sp>
+        <p:nvSpPr>
+          <p:cNvPr id="10" name="TextBox 9"/>
+          <p:cNvSpPr txBox="1"/>
+          <p:nvPr/>
+        </p:nvSpPr>
+        <p:spPr>
+          <a:xfrm>
+            <a:off x="3452652" y="1044207"/>
+            <a:ext cx="418704" cy="369332"/>
+          </a:xfrm>
+          <a:prstGeom prst="rect">
+            <a:avLst/>
+          </a:prstGeom>
+          <a:noFill/>
+        </p:spPr>
+        <p:txBody>
+          <a:bodyPr wrap="none" rtlCol="0">
+            <a:spAutoFit/>
+          </a:bodyPr>
+          <a:lstStyle/>
+          <a:p>
+            <a:r>
+              <a:rPr lang="en-US" smtClean="0"/>
+              <a:t>10</a:t>
+            </a:r>
+            <a:endParaRPr lang="en-US"/>
+          </a:p>
+        </p:txBody>
+      </p:sp>
+    </p:spTree>
+    <p:extLst>
+      <p:ext uri="{BB962C8B-B14F-4D97-AF65-F5344CB8AC3E}">
+        <p14:creationId xmlns:p14="http://schemas.microsoft.com/office/powerpoint/2010/main" val="749042394"/>
+      </p:ext>
+    </p:extLst>
+  </p:cSld>
+  <p:clrMapOvr>
+    <a:masterClrMapping/>
+  </p:clrMapOvr>
+  <p:timing>
+    <p:tnLst>
+      <p:par>
+        <p:cTn id="1" dur="indefinite" restart="never" nodeType="tmRoot"/>
+      </p:par>
+    </p:tnLst>
+  </p:timing>
+</p:sld>
+</file>
+
+<file path=ppt/slides/slide3.xml><?xml version="1.0" encoding="utf-8"?>
+<p:sld xmlns:a="http://schemas.openxmlformats.org/drawingml/2006/main" xmlns:r="http://schemas.openxmlformats.org/officeDocument/2006/relationships" xmlns:p="http://schemas.openxmlformats.org/presentationml/2006/main">
+  <p:cSld>
+    <p:spTree>
+      <p:nvGrpSpPr>
+        <p:cNvPr id="1" name=""/>
+        <p:cNvGrpSpPr/>
+        <p:nvPr/>
+      </p:nvGrpSpPr>
+      <p:grpSpPr>
+        <a:xfrm>
+          <a:off x="0" y="0"/>
+          <a:ext cx="0" cy="0"/>
+          <a:chOff x="0" y="0"/>
+          <a:chExt cx="0" cy="0"/>
+        </a:xfrm>
+      </p:grpSpPr>
+      <p:pic>
+        <p:nvPicPr>
+          <p:cNvPr id="5" name="Picture 4"/>
+          <p:cNvPicPr>
+            <a:picLocks noChangeAspect="1"/>
+          </p:cNvPicPr>
+          <p:nvPr/>
+        </p:nvPicPr>
+        <p:blipFill>
+          <a:blip r:embed="rId2">
+            <a:extLst>
+              <a:ext uri="{28A0092B-C50C-407E-A947-70E740481C1C}">
+                <a14:useLocalDpi xmlns:a14="http://schemas.microsoft.com/office/drawing/2010/main" val="0"/>
+              </a:ext>
+            </a:extLst>
+          </a:blip>
+          <a:stretch>
+            <a:fillRect/>
+          </a:stretch>
+        </p:blipFill>
+        <p:spPr>
+          <a:xfrm>
+            <a:off x="106632" y="212388"/>
+            <a:ext cx="2422811" cy="2380429"/>
+          </a:xfrm>
+          <a:prstGeom prst="rect">
+            <a:avLst/>
+          </a:prstGeom>
+        </p:spPr>
+      </p:pic>
+      <p:pic>
+        <p:nvPicPr>
+          <p:cNvPr id="8" name="Picture 7"/>
+          <p:cNvPicPr>
+            <a:picLocks noChangeAspect="1"/>
+          </p:cNvPicPr>
+          <p:nvPr/>
+        </p:nvPicPr>
+        <p:blipFill>
+          <a:blip r:embed="rId3">
+            <a:extLst>
+              <a:ext uri="{28A0092B-C50C-407E-A947-70E740481C1C}">
+                <a14:useLocalDpi xmlns:a14="http://schemas.microsoft.com/office/drawing/2010/main" val="0"/>
+              </a:ext>
+            </a:extLst>
+          </a:blip>
+          <a:stretch>
+            <a:fillRect/>
+          </a:stretch>
+        </p:blipFill>
+        <p:spPr>
+          <a:xfrm>
+            <a:off x="2849336" y="210894"/>
+            <a:ext cx="2417370" cy="2381924"/>
+          </a:xfrm>
+          <a:prstGeom prst="rect">
+            <a:avLst/>
+          </a:prstGeom>
+        </p:spPr>
+      </p:pic>
+      <p:pic>
+        <p:nvPicPr>
+          <p:cNvPr id="11" name="Picture 10"/>
+          <p:cNvPicPr>
+            <a:picLocks noChangeAspect="1"/>
+          </p:cNvPicPr>
+          <p:nvPr/>
+        </p:nvPicPr>
+        <p:blipFill>
+          <a:blip r:embed="rId4">
+            <a:extLst>
+              <a:ext uri="{28A0092B-C50C-407E-A947-70E740481C1C}">
+                <a14:useLocalDpi xmlns:a14="http://schemas.microsoft.com/office/drawing/2010/main" val="0"/>
+              </a:ext>
+            </a:extLst>
+          </a:blip>
+          <a:stretch>
+            <a:fillRect/>
+          </a:stretch>
+        </p:blipFill>
+        <p:spPr>
+          <a:xfrm>
+            <a:off x="5779826" y="212919"/>
+            <a:ext cx="2443835" cy="2379898"/>
+          </a:xfrm>
+          <a:prstGeom prst="rect">
+            <a:avLst/>
+          </a:prstGeom>
+        </p:spPr>
+      </p:pic>
+      <p:pic>
+        <p:nvPicPr>
+          <p:cNvPr id="13" name="Picture 12"/>
+          <p:cNvPicPr>
+            <a:picLocks noChangeAspect="1"/>
+          </p:cNvPicPr>
+          <p:nvPr/>
+        </p:nvPicPr>
+        <p:blipFill>
+          <a:blip r:embed="rId5">
+            <a:extLst>
+              <a:ext uri="{28A0092B-C50C-407E-A947-70E740481C1C}">
+                <a14:useLocalDpi xmlns:a14="http://schemas.microsoft.com/office/drawing/2010/main" val="0"/>
+              </a:ext>
+            </a:extLst>
+          </a:blip>
+          <a:stretch>
+            <a:fillRect/>
+          </a:stretch>
+        </p:blipFill>
+        <p:spPr>
+          <a:xfrm>
+            <a:off x="102531" y="3633849"/>
+            <a:ext cx="2426912" cy="2384209"/>
+          </a:xfrm>
+          <a:prstGeom prst="rect">
+            <a:avLst/>
+          </a:prstGeom>
+        </p:spPr>
+      </p:pic>
+      <p:pic>
+        <p:nvPicPr>
+          <p:cNvPr id="14" name="Picture 13"/>
+          <p:cNvPicPr>
+            <a:picLocks noChangeAspect="1"/>
+          </p:cNvPicPr>
+          <p:nvPr/>
+        </p:nvPicPr>
+        <p:blipFill>
+          <a:blip r:embed="rId6">
+            <a:extLst>
+              <a:ext uri="{28A0092B-C50C-407E-A947-70E740481C1C}">
+                <a14:useLocalDpi xmlns:a14="http://schemas.microsoft.com/office/drawing/2010/main" val="0"/>
+              </a:ext>
+            </a:extLst>
+          </a:blip>
+          <a:stretch>
+            <a:fillRect/>
+          </a:stretch>
+        </p:blipFill>
+        <p:spPr>
+          <a:xfrm>
+            <a:off x="3334121" y="3630776"/>
+            <a:ext cx="2539059" cy="2205946"/>
+          </a:xfrm>
+          <a:prstGeom prst="rect">
+            <a:avLst/>
+          </a:prstGeom>
+        </p:spPr>
+      </p:pic>
+      <p:pic>
+        <p:nvPicPr>
+          <p:cNvPr id="15" name="Picture 14"/>
+          <p:cNvPicPr>
+            <a:picLocks noChangeAspect="1"/>
+          </p:cNvPicPr>
+          <p:nvPr/>
+        </p:nvPicPr>
+        <p:blipFill>
+          <a:blip r:embed="rId7">
+            <a:extLst>
+              <a:ext uri="{28A0092B-C50C-407E-A947-70E740481C1C}">
+                <a14:useLocalDpi xmlns:a14="http://schemas.microsoft.com/office/drawing/2010/main" val="0"/>
+              </a:ext>
+            </a:extLst>
+          </a:blip>
+          <a:stretch>
+            <a:fillRect/>
+          </a:stretch>
+        </p:blipFill>
+        <p:spPr>
+          <a:xfrm>
+            <a:off x="6501205" y="3630777"/>
+            <a:ext cx="2444121" cy="2387281"/>
+          </a:xfrm>
+          <a:prstGeom prst="rect">
+            <a:avLst/>
+          </a:prstGeom>
+        </p:spPr>
+      </p:pic>
+      <p:pic>
+        <p:nvPicPr>
+          <p:cNvPr id="16" name="Picture 15"/>
+          <p:cNvPicPr>
+            <a:picLocks noChangeAspect="1"/>
+          </p:cNvPicPr>
+          <p:nvPr/>
+        </p:nvPicPr>
+        <p:blipFill>
+          <a:blip r:embed="rId8">
+            <a:extLst>
+              <a:ext uri="{28A0092B-C50C-407E-A947-70E740481C1C}">
+                <a14:useLocalDpi xmlns:a14="http://schemas.microsoft.com/office/drawing/2010/main" val="0"/>
+              </a:ext>
+            </a:extLst>
+          </a:blip>
+          <a:stretch>
+            <a:fillRect/>
+          </a:stretch>
+        </p:blipFill>
+        <p:spPr>
+          <a:xfrm>
+            <a:off x="8849869" y="215332"/>
+            <a:ext cx="2419814" cy="2377485"/>
+          </a:xfrm>
+          <a:prstGeom prst="rect">
+            <a:avLst/>
+          </a:prstGeom>
+        </p:spPr>
+      </p:pic>
+      <p:pic>
+        <p:nvPicPr>
+          <p:cNvPr id="17" name="Picture 16"/>
+          <p:cNvPicPr>
+            <a:picLocks noChangeAspect="1"/>
+          </p:cNvPicPr>
+          <p:nvPr/>
+        </p:nvPicPr>
+        <p:blipFill>
+          <a:blip r:embed="rId9">
+            <a:extLst>
+              <a:ext uri="{28A0092B-C50C-407E-A947-70E740481C1C}">
+                <a14:useLocalDpi xmlns:a14="http://schemas.microsoft.com/office/drawing/2010/main" val="0"/>
+              </a:ext>
+            </a:extLst>
+          </a:blip>
+          <a:stretch>
+            <a:fillRect/>
+          </a:stretch>
+        </p:blipFill>
+        <p:spPr>
+          <a:xfrm>
+            <a:off x="594137" y="2592817"/>
+            <a:ext cx="1447800" cy="381000"/>
+          </a:xfrm>
+          <a:prstGeom prst="rect">
+            <a:avLst/>
+          </a:prstGeom>
+        </p:spPr>
+      </p:pic>
+      <p:pic>
+        <p:nvPicPr>
+          <p:cNvPr id="18" name="Picture 17"/>
+          <p:cNvPicPr>
+            <a:picLocks noChangeAspect="1"/>
+          </p:cNvPicPr>
+          <p:nvPr/>
+        </p:nvPicPr>
+        <p:blipFill>
+          <a:blip r:embed="rId10">
+            <a:extLst>
+              <a:ext uri="{28A0092B-C50C-407E-A947-70E740481C1C}">
+                <a14:useLocalDpi xmlns:a14="http://schemas.microsoft.com/office/drawing/2010/main" val="0"/>
+              </a:ext>
+            </a:extLst>
+          </a:blip>
+          <a:stretch>
+            <a:fillRect/>
+          </a:stretch>
+        </p:blipFill>
+        <p:spPr>
+          <a:xfrm>
+            <a:off x="3334121" y="2661722"/>
+            <a:ext cx="1447800" cy="406400"/>
+          </a:xfrm>
+          <a:prstGeom prst="rect">
+            <a:avLst/>
+          </a:prstGeom>
+        </p:spPr>
+      </p:pic>
+      <p:pic>
+        <p:nvPicPr>
+          <p:cNvPr id="19" name="Picture 18"/>
+          <p:cNvPicPr>
+            <a:picLocks noChangeAspect="1"/>
+          </p:cNvPicPr>
+          <p:nvPr/>
+        </p:nvPicPr>
+        <p:blipFill>
+          <a:blip r:embed="rId11">
+            <a:extLst>
+              <a:ext uri="{28A0092B-C50C-407E-A947-70E740481C1C}">
+                <a14:useLocalDpi xmlns:a14="http://schemas.microsoft.com/office/drawing/2010/main" val="0"/>
+              </a:ext>
+            </a:extLst>
+          </a:blip>
+          <a:stretch>
+            <a:fillRect/>
+          </a:stretch>
+        </p:blipFill>
+        <p:spPr>
+          <a:xfrm>
+            <a:off x="6106393" y="2618508"/>
+            <a:ext cx="1790700" cy="431800"/>
+          </a:xfrm>
+          <a:prstGeom prst="rect">
+            <a:avLst/>
+          </a:prstGeom>
+        </p:spPr>
+      </p:pic>
+      <p:pic>
+        <p:nvPicPr>
+          <p:cNvPr id="20" name="Picture 19"/>
+          <p:cNvPicPr>
+            <a:picLocks noChangeAspect="1"/>
+          </p:cNvPicPr>
+          <p:nvPr/>
+        </p:nvPicPr>
+        <p:blipFill>
+          <a:blip r:embed="rId12">
+            <a:extLst>
+              <a:ext uri="{28A0092B-C50C-407E-A947-70E740481C1C}">
+                <a14:useLocalDpi xmlns:a14="http://schemas.microsoft.com/office/drawing/2010/main" val="0"/>
+              </a:ext>
+            </a:extLst>
+          </a:blip>
+          <a:stretch>
+            <a:fillRect/>
+          </a:stretch>
+        </p:blipFill>
+        <p:spPr>
+          <a:xfrm>
+            <a:off x="9285076" y="2622019"/>
+            <a:ext cx="1549400" cy="469900"/>
+          </a:xfrm>
+          <a:prstGeom prst="rect">
+            <a:avLst/>
+          </a:prstGeom>
+        </p:spPr>
+      </p:pic>
+      <p:pic>
+        <p:nvPicPr>
+          <p:cNvPr id="21" name="Picture 20"/>
+          <p:cNvPicPr>
+            <a:picLocks noChangeAspect="1"/>
+          </p:cNvPicPr>
+          <p:nvPr/>
+        </p:nvPicPr>
+        <p:blipFill>
+          <a:blip r:embed="rId13">
+            <a:extLst>
+              <a:ext uri="{28A0092B-C50C-407E-A947-70E740481C1C}">
+                <a14:useLocalDpi xmlns:a14="http://schemas.microsoft.com/office/drawing/2010/main" val="0"/>
+              </a:ext>
+            </a:extLst>
+          </a:blip>
+          <a:stretch>
+            <a:fillRect/>
+          </a:stretch>
+        </p:blipFill>
+        <p:spPr>
+          <a:xfrm>
+            <a:off x="9445394" y="3630776"/>
+            <a:ext cx="2437314" cy="2387281"/>
+          </a:xfrm>
+          <a:prstGeom prst="rect">
+            <a:avLst/>
+          </a:prstGeom>
+        </p:spPr>
+      </p:pic>
+      <p:pic>
+        <p:nvPicPr>
+          <p:cNvPr id="22" name="Picture 21"/>
+          <p:cNvPicPr>
+            <a:picLocks noChangeAspect="1"/>
+          </p:cNvPicPr>
+          <p:nvPr/>
+        </p:nvPicPr>
+        <p:blipFill>
+          <a:blip r:embed="rId14">
+            <a:extLst>
+              <a:ext uri="{28A0092B-C50C-407E-A947-70E740481C1C}">
+                <a14:useLocalDpi xmlns:a14="http://schemas.microsoft.com/office/drawing/2010/main" val="0"/>
+              </a:ext>
+            </a:extLst>
+          </a:blip>
+          <a:stretch>
+            <a:fillRect/>
+          </a:stretch>
+        </p:blipFill>
+        <p:spPr>
+          <a:xfrm>
+            <a:off x="535214" y="6018057"/>
+            <a:ext cx="1388588" cy="345682"/>
+          </a:xfrm>
+          <a:prstGeom prst="rect">
+            <a:avLst/>
+          </a:prstGeom>
+        </p:spPr>
+      </p:pic>
+      <p:pic>
+        <p:nvPicPr>
+          <p:cNvPr id="23" name="Picture 22"/>
+          <p:cNvPicPr>
+            <a:picLocks noChangeAspect="1"/>
+          </p:cNvPicPr>
+          <p:nvPr/>
+        </p:nvPicPr>
+        <p:blipFill>
+          <a:blip r:embed="rId15">
+            <a:extLst>
+              <a:ext uri="{28A0092B-C50C-407E-A947-70E740481C1C}">
+                <a14:useLocalDpi xmlns:a14="http://schemas.microsoft.com/office/drawing/2010/main" val="0"/>
+              </a:ext>
+            </a:extLst>
+          </a:blip>
+          <a:stretch>
+            <a:fillRect/>
+          </a:stretch>
+        </p:blipFill>
+        <p:spPr>
+          <a:xfrm>
+            <a:off x="4017162" y="6102828"/>
+            <a:ext cx="1124854" cy="277289"/>
+          </a:xfrm>
+          <a:prstGeom prst="rect">
+            <a:avLst/>
+          </a:prstGeom>
+        </p:spPr>
+      </p:pic>
+      <p:pic>
+        <p:nvPicPr>
+          <p:cNvPr id="24" name="Picture 23"/>
+          <p:cNvPicPr>
+            <a:picLocks noChangeAspect="1"/>
+          </p:cNvPicPr>
+          <p:nvPr/>
+        </p:nvPicPr>
+        <p:blipFill>
+          <a:blip r:embed="rId16">
+            <a:extLst>
+              <a:ext uri="{28A0092B-C50C-407E-A947-70E740481C1C}">
+                <a14:useLocalDpi xmlns:a14="http://schemas.microsoft.com/office/drawing/2010/main" val="0"/>
+              </a:ext>
+            </a:extLst>
+          </a:blip>
+          <a:stretch>
+            <a:fillRect/>
+          </a:stretch>
+        </p:blipFill>
+        <p:spPr>
+          <a:xfrm>
+            <a:off x="7098075" y="6098529"/>
+            <a:ext cx="1258863" cy="281588"/>
+          </a:xfrm>
+          <a:prstGeom prst="rect">
+            <a:avLst/>
+          </a:prstGeom>
+        </p:spPr>
+      </p:pic>
+      <p:pic>
+        <p:nvPicPr>
+          <p:cNvPr id="25" name="Picture 24"/>
+          <p:cNvPicPr>
+            <a:picLocks noChangeAspect="1"/>
+          </p:cNvPicPr>
+          <p:nvPr/>
+        </p:nvPicPr>
+        <p:blipFill>
+          <a:blip r:embed="rId17">
+            <a:extLst>
+              <a:ext uri="{28A0092B-C50C-407E-A947-70E740481C1C}">
+                <a14:useLocalDpi xmlns:a14="http://schemas.microsoft.com/office/drawing/2010/main" val="0"/>
+              </a:ext>
+            </a:extLst>
+          </a:blip>
+          <a:stretch>
+            <a:fillRect/>
+          </a:stretch>
+        </p:blipFill>
+        <p:spPr>
+          <a:xfrm>
+            <a:off x="9861024" y="6057060"/>
+            <a:ext cx="1606053" cy="267675"/>
+          </a:xfrm>
+          <a:prstGeom prst="rect">
+            <a:avLst/>
+          </a:prstGeom>
+        </p:spPr>
+      </p:pic>
+    </p:spTree>
+    <p:extLst>
+      <p:ext uri="{BB962C8B-B14F-4D97-AF65-F5344CB8AC3E}">
+        <p14:creationId xmlns:p14="http://schemas.microsoft.com/office/powerpoint/2010/main" val="330531928"/>
       </p:ext>
     </p:extLst>
   </p:cSld>

</xml_diff>